<commit_message>
modified scope in PPT
</commit_message>
<xml_diff>
--- a/Documents/Project Presentation/Presentation.pptx
+++ b/Documents/Project Presentation/Presentation.pptx
@@ -114,7 +114,7 @@
   </p:defaultTextStyle>
   <p:extLst>
     <p:ext uri="{EFAFB233-063F-42B5-8137-9DF3F51BA10A}">
-      <p15:sldGuideLst xmlns:p15="http://schemas.microsoft.com/office/powerpoint/2012/main" xmlns="">
+      <p15:sldGuideLst xmlns="" xmlns:p15="http://schemas.microsoft.com/office/powerpoint/2012/main">
         <p15:guide id="1" orient="horz" pos="2160">
           <p15:clr>
             <a:srgbClr val="A4A3A4"/>
@@ -3415,7 +3415,7 @@
             <a:lum/>
             <a:extLst>
               <a:ext uri="{BEBA8EAE-BF5A-486C-A8C5-ECC9F3942E4B}">
-                <a14:imgProps xmlns:a14="http://schemas.microsoft.com/office/drawing/2010/main" xmlns="">
+                <a14:imgProps xmlns="" xmlns:a14="http://schemas.microsoft.com/office/drawing/2010/main">
                   <a14:imgLayer r:embed="rId3">
                     <a14:imgEffect>
                       <a14:artisticTexturizer/>
@@ -3462,7 +3462,7 @@
           <a:blip r:embed="rId4" cstate="print">
             <a:extLst>
               <a:ext uri="{28A0092B-C50C-407E-A947-70E740481C1C}">
-                <a14:useLocalDpi xmlns:a14="http://schemas.microsoft.com/office/drawing/2010/main" xmlns="" val="0"/>
+                <a14:useLocalDpi xmlns="" xmlns:a14="http://schemas.microsoft.com/office/drawing/2010/main" val="0"/>
               </a:ext>
             </a:extLst>
           </a:blip>
@@ -3482,7 +3482,7 @@
           <a:noFill/>
           <a:extLst>
             <a:ext uri="{909E8E84-426E-40DD-AFC4-6F175D3DCCD1}">
-              <a14:hiddenFill xmlns:a14="http://schemas.microsoft.com/office/drawing/2010/main" xmlns="">
+              <a14:hiddenFill xmlns="" xmlns:a14="http://schemas.microsoft.com/office/drawing/2010/main">
                 <a:solidFill>
                   <a:srgbClr val="FFFFFF"/>
                 </a:solidFill>
@@ -3702,7 +3702,7 @@
     </p:spTree>
     <p:extLst>
       <p:ext uri="{BB962C8B-B14F-4D97-AF65-F5344CB8AC3E}">
-        <p14:creationId xmlns:p14="http://schemas.microsoft.com/office/powerpoint/2010/main" xmlns="" val="4035399814"/>
+        <p14:creationId xmlns="" xmlns:p14="http://schemas.microsoft.com/office/powerpoint/2010/main" val="4035399814"/>
       </p:ext>
     </p:extLst>
   </p:cSld>
@@ -3859,7 +3859,7 @@
     </p:spTree>
     <p:extLst>
       <p:ext uri="{BB962C8B-B14F-4D97-AF65-F5344CB8AC3E}">
-        <p14:creationId xmlns:p14="http://schemas.microsoft.com/office/powerpoint/2010/main" xmlns="" val="189342242"/>
+        <p14:creationId xmlns="" xmlns:p14="http://schemas.microsoft.com/office/powerpoint/2010/main" val="189342242"/>
       </p:ext>
     </p:extLst>
   </p:cSld>
@@ -3905,7 +3905,7 @@
           <a:blip r:embed="rId2" cstate="print">
             <a:extLst>
               <a:ext uri="{28A0092B-C50C-407E-A947-70E740481C1C}">
-                <a14:useLocalDpi xmlns:a14="http://schemas.microsoft.com/office/drawing/2010/main" xmlns="" val="0"/>
+                <a14:useLocalDpi xmlns="" xmlns:a14="http://schemas.microsoft.com/office/drawing/2010/main" val="0"/>
               </a:ext>
             </a:extLst>
           </a:blip>
@@ -3928,14 +3928,14 @@
           </a:ln>
           <a:extLst>
             <a:ext uri="{909E8E84-426E-40DD-AFC4-6F175D3DCCD1}">
-              <a14:hiddenFill xmlns:a14="http://schemas.microsoft.com/office/drawing/2010/main" xmlns="">
+              <a14:hiddenFill xmlns="" xmlns:a14="http://schemas.microsoft.com/office/drawing/2010/main">
                 <a:solidFill>
                   <a:srgbClr val="FFFFFF"/>
                 </a:solidFill>
               </a14:hiddenFill>
             </a:ext>
             <a:ext uri="{91240B29-F687-4F45-9708-019B960494DF}">
-              <a14:hiddenLine xmlns:a14="http://schemas.microsoft.com/office/drawing/2010/main" xmlns="" w="9525">
+              <a14:hiddenLine xmlns="" xmlns:a14="http://schemas.microsoft.com/office/drawing/2010/main" w="9525">
                 <a:solidFill>
                   <a:srgbClr val="000000"/>
                 </a:solidFill>
@@ -3984,7 +3984,7 @@
           <a:blip r:embed="rId3" cstate="print">
             <a:extLst>
               <a:ext uri="{28A0092B-C50C-407E-A947-70E740481C1C}">
-                <a14:useLocalDpi xmlns:a14="http://schemas.microsoft.com/office/drawing/2010/main" xmlns="" val="0"/>
+                <a14:useLocalDpi xmlns="" xmlns:a14="http://schemas.microsoft.com/office/drawing/2010/main" val="0"/>
               </a:ext>
             </a:extLst>
           </a:blip>
@@ -4019,7 +4019,7 @@
           <a:blip r:embed="rId4" cstate="print">
             <a:extLst>
               <a:ext uri="{28A0092B-C50C-407E-A947-70E740481C1C}">
-                <a14:useLocalDpi xmlns:a14="http://schemas.microsoft.com/office/drawing/2010/main" xmlns="" val="0"/>
+                <a14:useLocalDpi xmlns="" xmlns:a14="http://schemas.microsoft.com/office/drawing/2010/main" val="0"/>
               </a:ext>
             </a:extLst>
           </a:blip>
@@ -4042,14 +4042,14 @@
           </a:ln>
           <a:extLst>
             <a:ext uri="{909E8E84-426E-40DD-AFC4-6F175D3DCCD1}">
-              <a14:hiddenFill xmlns:a14="http://schemas.microsoft.com/office/drawing/2010/main" xmlns="">
+              <a14:hiddenFill xmlns="" xmlns:a14="http://schemas.microsoft.com/office/drawing/2010/main">
                 <a:solidFill>
                   <a:srgbClr val="FFFFFF"/>
                 </a:solidFill>
               </a14:hiddenFill>
             </a:ext>
             <a:ext uri="{91240B29-F687-4F45-9708-019B960494DF}">
-              <a14:hiddenLine xmlns:a14="http://schemas.microsoft.com/office/drawing/2010/main" xmlns="" w="9525">
+              <a14:hiddenLine xmlns="" xmlns:a14="http://schemas.microsoft.com/office/drawing/2010/main" w="9525">
                 <a:solidFill>
                   <a:srgbClr val="000000"/>
                 </a:solidFill>
@@ -4073,7 +4073,7 @@
           <a:blip r:embed="rId5" cstate="print">
             <a:extLst>
               <a:ext uri="{28A0092B-C50C-407E-A947-70E740481C1C}">
-                <a14:useLocalDpi xmlns:a14="http://schemas.microsoft.com/office/drawing/2010/main" xmlns="" val="0"/>
+                <a14:useLocalDpi xmlns="" xmlns:a14="http://schemas.microsoft.com/office/drawing/2010/main" val="0"/>
               </a:ext>
             </a:extLst>
           </a:blip>
@@ -4097,14 +4097,14 @@
           <a:effectLst/>
           <a:extLst>
             <a:ext uri="{909E8E84-426E-40DD-AFC4-6F175D3DCCD1}">
-              <a14:hiddenFill xmlns:a14="http://schemas.microsoft.com/office/drawing/2010/main" xmlns="">
+              <a14:hiddenFill xmlns="" xmlns:a14="http://schemas.microsoft.com/office/drawing/2010/main">
                 <a:solidFill>
                   <a:schemeClr val="accent1"/>
                 </a:solidFill>
               </a14:hiddenFill>
             </a:ext>
             <a:ext uri="{91240B29-F687-4F45-9708-019B960494DF}">
-              <a14:hiddenLine xmlns:a14="http://schemas.microsoft.com/office/drawing/2010/main" xmlns="" w="9525">
+              <a14:hiddenLine xmlns="" xmlns:a14="http://schemas.microsoft.com/office/drawing/2010/main" w="9525">
                 <a:solidFill>
                   <a:schemeClr val="tx1"/>
                 </a:solidFill>
@@ -4114,7 +4114,7 @@
               </a14:hiddenLine>
             </a:ext>
             <a:ext uri="{AF507438-7753-43E0-B8FC-AC1667EBCBE1}">
-              <a14:hiddenEffects xmlns:a14="http://schemas.microsoft.com/office/drawing/2010/main" xmlns="">
+              <a14:hiddenEffects xmlns="" xmlns:a14="http://schemas.microsoft.com/office/drawing/2010/main">
                 <a:effectLst>
                   <a:outerShdw dist="35921" dir="2700000" algn="ctr" rotWithShape="0">
                     <a:schemeClr val="bg2"/>
@@ -4619,7 +4619,7 @@
           <a:blip r:embed="rId6" cstate="print">
             <a:extLst>
               <a:ext uri="{28A0092B-C50C-407E-A947-70E740481C1C}">
-                <a14:useLocalDpi xmlns:a14="http://schemas.microsoft.com/office/drawing/2010/main" xmlns="" val="0"/>
+                <a14:useLocalDpi xmlns="" xmlns:a14="http://schemas.microsoft.com/office/drawing/2010/main" val="0"/>
               </a:ext>
             </a:extLst>
           </a:blip>
@@ -4700,7 +4700,7 @@
     </p:spTree>
     <p:extLst>
       <p:ext uri="{BB962C8B-B14F-4D97-AF65-F5344CB8AC3E}">
-        <p14:creationId xmlns:p14="http://schemas.microsoft.com/office/powerpoint/2010/main" xmlns="" val="2920084717"/>
+        <p14:creationId xmlns="" xmlns:p14="http://schemas.microsoft.com/office/powerpoint/2010/main" val="2920084717"/>
       </p:ext>
     </p:extLst>
   </p:cSld>
@@ -4781,7 +4781,7 @@
           <a:blip r:embed="rId2" cstate="print">
             <a:extLst>
               <a:ext uri="{28A0092B-C50C-407E-A947-70E740481C1C}">
-                <a14:useLocalDpi xmlns:a14="http://schemas.microsoft.com/office/drawing/2010/main" xmlns="" val="0"/>
+                <a14:useLocalDpi xmlns="" xmlns:a14="http://schemas.microsoft.com/office/drawing/2010/main" val="0"/>
               </a:ext>
             </a:extLst>
           </a:blip>
@@ -4802,7 +4802,7 @@
     </p:spTree>
     <p:extLst>
       <p:ext uri="{BB962C8B-B14F-4D97-AF65-F5344CB8AC3E}">
-        <p14:creationId xmlns:p14="http://schemas.microsoft.com/office/powerpoint/2010/main" xmlns="" val="1394194694"/>
+        <p14:creationId xmlns="" xmlns:p14="http://schemas.microsoft.com/office/powerpoint/2010/main" val="1394194694"/>
       </p:ext>
     </p:extLst>
   </p:cSld>
@@ -4874,7 +4874,7 @@
           <a:blip r:embed="rId2" cstate="print">
             <a:extLst>
               <a:ext uri="{28A0092B-C50C-407E-A947-70E740481C1C}">
-                <a14:useLocalDpi xmlns:a14="http://schemas.microsoft.com/office/drawing/2010/main" xmlns="" val="0"/>
+                <a14:useLocalDpi xmlns="" xmlns:a14="http://schemas.microsoft.com/office/drawing/2010/main" val="0"/>
               </a:ext>
             </a:extLst>
           </a:blip>
@@ -4892,7 +4892,7 @@
     </p:spTree>
     <p:extLst>
       <p:ext uri="{BB962C8B-B14F-4D97-AF65-F5344CB8AC3E}">
-        <p14:creationId xmlns:p14="http://schemas.microsoft.com/office/powerpoint/2010/main" xmlns="" val="1655793141"/>
+        <p14:creationId xmlns="" xmlns:p14="http://schemas.microsoft.com/office/powerpoint/2010/main" val="1655793141"/>
       </p:ext>
     </p:extLst>
   </p:cSld>
@@ -4936,7 +4936,7 @@
           <a:blip r:embed="rId2" cstate="print">
             <a:extLst>
               <a:ext uri="{28A0092B-C50C-407E-A947-70E740481C1C}">
-                <a14:useLocalDpi xmlns:a14="http://schemas.microsoft.com/office/drawing/2010/main" xmlns="" val="0"/>
+                <a14:useLocalDpi xmlns="" xmlns:a14="http://schemas.microsoft.com/office/drawing/2010/main" val="0"/>
               </a:ext>
             </a:extLst>
           </a:blip>
@@ -4989,7 +4989,7 @@
     </p:spTree>
     <p:extLst>
       <p:ext uri="{BB962C8B-B14F-4D97-AF65-F5344CB8AC3E}">
-        <p14:creationId xmlns:p14="http://schemas.microsoft.com/office/powerpoint/2010/main" xmlns="" val="3569775927"/>
+        <p14:creationId xmlns="" xmlns:p14="http://schemas.microsoft.com/office/powerpoint/2010/main" val="3569775927"/>
       </p:ext>
     </p:extLst>
   </p:cSld>
@@ -5062,14 +5062,38 @@
           <a:p>
             <a:r>
               <a:rPr lang="en-US" dirty="0"/>
-              <a:t>Maintaining copies of all the codes and JSON packages uploaded through the framework which can be used for analytics.</a:t>
-            </a:r>
+              <a:t>Maintaining </a:t>
+            </a:r>
+            <a:r>
+              <a:rPr lang="en-US" dirty="0" smtClean="0"/>
+              <a:t>Bot</a:t>
+            </a:r>
+            <a:r>
+              <a:rPr lang="en-US" dirty="0" smtClean="0"/>
+              <a:t>s uploaded to maintain version systems.</a:t>
+            </a:r>
+            <a:endParaRPr lang="en-US" dirty="0"/>
           </a:p>
           <a:p>
             <a:r>
               <a:rPr lang="en-US" dirty="0"/>
-              <a:t>Advertising on the website.</a:t>
-            </a:r>
+              <a:t>Advertising on the website</a:t>
+            </a:r>
+            <a:r>
+              <a:rPr lang="en-US" dirty="0" smtClean="0"/>
+              <a:t>.</a:t>
+            </a:r>
+          </a:p>
+          <a:p>
+            <a:r>
+              <a:rPr lang="en-US" dirty="0" smtClean="0"/>
+              <a:t>Simplicity and </a:t>
+            </a:r>
+            <a:r>
+              <a:rPr lang="en-US" smtClean="0"/>
+              <a:t>Scalability exercise.</a:t>
+            </a:r>
+            <a:endParaRPr lang="en-US" dirty="0"/>
           </a:p>
           <a:p>
             <a:endParaRPr lang="en-US" dirty="0"/>
@@ -5086,24 +5110,18 @@
           </a:p>
           <a:p>
             <a:r>
-              <a:rPr lang="en-US" dirty="0"/>
-              <a:t>There is only one competitor in the bot building market : </a:t>
-            </a:r>
-            <a:r>
-              <a:rPr lang="en-US" dirty="0">
-                <a:solidFill>
-                  <a:srgbClr val="C00000"/>
-                </a:solidFill>
-              </a:rPr>
-              <a:t>gupshup.io. </a:t>
-            </a:r>
-          </a:p>
-          <a:p>
-            <a:endParaRPr lang="en-US" dirty="0">
-              <a:solidFill>
-                <a:srgbClr val="C00000"/>
-              </a:solidFill>
-            </a:endParaRPr>
+              <a:rPr lang="en-US" dirty="0" smtClean="0"/>
+              <a:t>We can also study data generated by the </a:t>
+            </a:r>
+            <a:r>
+              <a:rPr lang="en-US" dirty="0" err="1" smtClean="0"/>
+              <a:t>package.json</a:t>
+            </a:r>
+            <a:r>
+              <a:rPr lang="en-US" dirty="0" smtClean="0"/>
+              <a:t> which will help determine which node libraries are famous amount young developers and how we can improve them.</a:t>
+            </a:r>
+            <a:endParaRPr lang="en-US" dirty="0"/>
           </a:p>
           <a:p>
             <a:pPr marL="0" indent="0">
@@ -5116,7 +5134,7 @@
     </p:spTree>
     <p:extLst>
       <p:ext uri="{BB962C8B-B14F-4D97-AF65-F5344CB8AC3E}">
-        <p14:creationId xmlns:p14="http://schemas.microsoft.com/office/powerpoint/2010/main" xmlns="" val="3834912069"/>
+        <p14:creationId xmlns="" xmlns:p14="http://schemas.microsoft.com/office/powerpoint/2010/main" val="3834912069"/>
       </p:ext>
     </p:extLst>
   </p:cSld>
@@ -5233,7 +5251,7 @@
     </p:spTree>
     <p:extLst>
       <p:ext uri="{BB962C8B-B14F-4D97-AF65-F5344CB8AC3E}">
-        <p14:creationId xmlns:p14="http://schemas.microsoft.com/office/powerpoint/2010/main" xmlns="" val="1359323760"/>
+        <p14:creationId xmlns="" xmlns:p14="http://schemas.microsoft.com/office/powerpoint/2010/main" val="1359323760"/>
       </p:ext>
     </p:extLst>
   </p:cSld>
@@ -5279,7 +5297,7 @@
           <a:blip r:embed="rId2" cstate="print">
             <a:extLst>
               <a:ext uri="{28A0092B-C50C-407E-A947-70E740481C1C}">
-                <a14:useLocalDpi xmlns:a14="http://schemas.microsoft.com/office/drawing/2010/main" xmlns="" val="0"/>
+                <a14:useLocalDpi xmlns="" xmlns:a14="http://schemas.microsoft.com/office/drawing/2010/main" val="0"/>
               </a:ext>
             </a:extLst>
           </a:blip>
@@ -5299,7 +5317,7 @@
           <a:noFill/>
           <a:extLst>
             <a:ext uri="{909E8E84-426E-40DD-AFC4-6F175D3DCCD1}">
-              <a14:hiddenFill xmlns:a14="http://schemas.microsoft.com/office/drawing/2010/main" xmlns="">
+              <a14:hiddenFill xmlns="" xmlns:a14="http://schemas.microsoft.com/office/drawing/2010/main">
                 <a:solidFill>
                   <a:srgbClr val="FFFFFF"/>
                 </a:solidFill>
@@ -5320,7 +5338,7 @@
           <a:blip r:embed="rId3" cstate="print">
             <a:extLst>
               <a:ext uri="{28A0092B-C50C-407E-A947-70E740481C1C}">
-                <a14:useLocalDpi xmlns:a14="http://schemas.microsoft.com/office/drawing/2010/main" xmlns="" val="0"/>
+                <a14:useLocalDpi xmlns="" xmlns:a14="http://schemas.microsoft.com/office/drawing/2010/main" val="0"/>
               </a:ext>
             </a:extLst>
           </a:blip>
@@ -5340,7 +5358,7 @@
           <a:noFill/>
           <a:extLst>
             <a:ext uri="{909E8E84-426E-40DD-AFC4-6F175D3DCCD1}">
-              <a14:hiddenFill xmlns:a14="http://schemas.microsoft.com/office/drawing/2010/main" xmlns="">
+              <a14:hiddenFill xmlns="" xmlns:a14="http://schemas.microsoft.com/office/drawing/2010/main">
                 <a:solidFill>
                   <a:srgbClr val="FFFFFF"/>
                 </a:solidFill>
@@ -5361,7 +5379,7 @@
           <a:blip r:embed="rId3" cstate="print">
             <a:extLst>
               <a:ext uri="{28A0092B-C50C-407E-A947-70E740481C1C}">
-                <a14:useLocalDpi xmlns:a14="http://schemas.microsoft.com/office/drawing/2010/main" xmlns="" val="0"/>
+                <a14:useLocalDpi xmlns="" xmlns:a14="http://schemas.microsoft.com/office/drawing/2010/main" val="0"/>
               </a:ext>
             </a:extLst>
           </a:blip>
@@ -5381,7 +5399,7 @@
           <a:noFill/>
           <a:extLst>
             <a:ext uri="{909E8E84-426E-40DD-AFC4-6F175D3DCCD1}">
-              <a14:hiddenFill xmlns:a14="http://schemas.microsoft.com/office/drawing/2010/main" xmlns="">
+              <a14:hiddenFill xmlns="" xmlns:a14="http://schemas.microsoft.com/office/drawing/2010/main">
                 <a:solidFill>
                   <a:srgbClr val="FFFFFF"/>
                 </a:solidFill>
@@ -5435,7 +5453,7 @@
           <a:blip r:embed="rId4" cstate="print">
             <a:extLst>
               <a:ext uri="{28A0092B-C50C-407E-A947-70E740481C1C}">
-                <a14:useLocalDpi xmlns:a14="http://schemas.microsoft.com/office/drawing/2010/main" xmlns="" val="0"/>
+                <a14:useLocalDpi xmlns="" xmlns:a14="http://schemas.microsoft.com/office/drawing/2010/main" val="0"/>
               </a:ext>
             </a:extLst>
           </a:blip>
@@ -5455,7 +5473,7 @@
           <a:noFill/>
           <a:extLst>
             <a:ext uri="{909E8E84-426E-40DD-AFC4-6F175D3DCCD1}">
-              <a14:hiddenFill xmlns:a14="http://schemas.microsoft.com/office/drawing/2010/main" xmlns="">
+              <a14:hiddenFill xmlns="" xmlns:a14="http://schemas.microsoft.com/office/drawing/2010/main">
                 <a:solidFill>
                   <a:srgbClr val="FFFFFF"/>
                 </a:solidFill>
@@ -5467,7 +5485,7 @@
     </p:spTree>
     <p:extLst>
       <p:ext uri="{BB962C8B-B14F-4D97-AF65-F5344CB8AC3E}">
-        <p14:creationId xmlns:p14="http://schemas.microsoft.com/office/powerpoint/2010/main" xmlns="" val="165969356"/>
+        <p14:creationId xmlns="" xmlns:p14="http://schemas.microsoft.com/office/powerpoint/2010/main" val="165969356"/>
       </p:ext>
     </p:extLst>
   </p:cSld>

</xml_diff>